<commit_message>
Minor changes in Project Presentation.pptx
</commit_message>
<xml_diff>
--- a/Project Presentation.pptx
+++ b/Project Presentation.pptx
@@ -330,7 +330,7 @@
             <a:fld id="{11A6662E-FAF4-44BC-88B5-85A7CBFB6D30}" type="datetime1">
               <a:rPr lang="en-US" smtClean="0"/>
               <a:pPr/>
-              <a:t>6/29/2021</a:t>
+              <a:t>8/2/2021</a:t>
             </a:fld>
             <a:endParaRPr lang="en-US"/>
           </a:p>
@@ -542,7 +542,7 @@
           <a:p>
             <a:fld id="{4C559632-1575-4E14-B53B-3DC3D5ED3947}" type="datetime1">
               <a:rPr lang="en-US" smtClean="0"/>
-              <a:t>6/29/2021</a:t>
+              <a:t>8/2/2021</a:t>
             </a:fld>
             <a:endParaRPr lang="en-US"/>
           </a:p>
@@ -757,7 +757,7 @@
           <a:p>
             <a:fld id="{CC4A6868-2568-4CC9-B302-F37117B01A6E}" type="datetime1">
               <a:rPr lang="en-US" smtClean="0"/>
-              <a:t>6/29/2021</a:t>
+              <a:t>8/2/2021</a:t>
             </a:fld>
             <a:endParaRPr lang="en-US"/>
           </a:p>
@@ -958,7 +958,7 @@
           <a:p>
             <a:fld id="{0055F08A-1E71-4B2B-BB49-E743F2903911}" type="datetime1">
               <a:rPr lang="en-US" smtClean="0"/>
-              <a:t>6/29/2021</a:t>
+              <a:t>8/2/2021</a:t>
             </a:fld>
             <a:endParaRPr lang="en-US" dirty="0"/>
           </a:p>
@@ -1237,7 +1237,7 @@
           <a:p>
             <a:fld id="{15417D9E-721A-44BB-8863-9873FE64DA75}" type="datetime1">
               <a:rPr lang="en-US" smtClean="0"/>
-              <a:t>6/29/2021</a:t>
+              <a:t>8/2/2021</a:t>
             </a:fld>
             <a:endParaRPr lang="en-US"/>
           </a:p>
@@ -1505,7 +1505,7 @@
           <a:p>
             <a:fld id="{5F31DA2F-80B8-49CF-99FB-5ABCA53A607A}" type="datetime1">
               <a:rPr lang="en-US" smtClean="0"/>
-              <a:t>6/29/2021</a:t>
+              <a:t>8/2/2021</a:t>
             </a:fld>
             <a:endParaRPr lang="en-US"/>
           </a:p>
@@ -1921,7 +1921,7 @@
           <a:p>
             <a:fld id="{28852172-E6C9-4B6C-929A-A9DE3837BBF1}" type="datetime1">
               <a:rPr lang="en-US" smtClean="0"/>
-              <a:t>6/29/2021</a:t>
+              <a:t>8/2/2021</a:t>
             </a:fld>
             <a:endParaRPr lang="en-US"/>
           </a:p>
@@ -2070,7 +2070,7 @@
           <a:p>
             <a:fld id="{3AB41CFF-90C9-47B3-9DA1-F2BF8D839F7E}" type="datetime1">
               <a:rPr lang="en-US" smtClean="0"/>
-              <a:t>6/29/2021</a:t>
+              <a:t>8/2/2021</a:t>
             </a:fld>
             <a:endParaRPr lang="en-US"/>
           </a:p>
@@ -2196,7 +2196,7 @@
           <a:p>
             <a:fld id="{F06048FA-06AB-4884-A69B-986B96E68A24}" type="datetime1">
               <a:rPr lang="en-US" smtClean="0"/>
-              <a:t>6/29/2021</a:t>
+              <a:t>8/2/2021</a:t>
             </a:fld>
             <a:endParaRPr lang="en-US"/>
           </a:p>
@@ -2447,7 +2447,7 @@
           <a:p>
             <a:fld id="{50DB7ABA-0172-4F9C-889D-567164F66BCD}" type="datetime1">
               <a:rPr lang="en-US" smtClean="0"/>
-              <a:t>6/29/2021</a:t>
+              <a:t>8/2/2021</a:t>
             </a:fld>
             <a:endParaRPr lang="en-US"/>
           </a:p>
@@ -2892,7 +2892,7 @@
           <a:p>
             <a:fld id="{78AC6A5B-8AE7-4A41-B5A7-9ADC6686DC18}" type="datetime1">
               <a:rPr lang="en-US" smtClean="0"/>
-              <a:t>6/29/2021</a:t>
+              <a:t>8/2/2021</a:t>
             </a:fld>
             <a:endParaRPr lang="en-US"/>
           </a:p>
@@ -3220,7 +3220,7 @@
             <a:fld id="{57E0CF6C-748E-4B7A-BC8B-3011EF78ED13}" type="datetime1">
               <a:rPr lang="en-US" smtClean="0"/>
               <a:pPr/>
-              <a:t>6/29/2021</a:t>
+              <a:t>8/2/2021</a:t>
             </a:fld>
             <a:endParaRPr lang="en-US" dirty="0"/>
           </a:p>
@@ -11922,8 +11922,8 @@
           </a:p>
         </p:txBody>
       </p:sp>
-      <mc:AlternateContent xmlns:mc="http://schemas.openxmlformats.org/markup-compatibility/2006" xmlns:a14="http://schemas.microsoft.com/office/drawing/2010/main">
-        <mc:Choice Requires="a14">
+      <mc:AlternateContent xmlns:mc="http://schemas.openxmlformats.org/markup-compatibility/2006">
+        <mc:Choice xmlns:a14="http://schemas.microsoft.com/office/drawing/2010/main" Requires="a14">
           <p:sp>
             <p:nvSpPr>
               <p:cNvPr id="3" name="Content Placeholder 2">
@@ -11955,7 +11955,7 @@
               <a:p>
                 <a:r>
                   <a:rPr lang="en-US" dirty="0"/>
-                  <a:t>Doesn’t require invariants from user – finds them</a:t>
+                  <a:t>Can be used without invariants from user – supposed to find them</a:t>
                 </a:r>
               </a:p>
               <a:p>
@@ -12603,7 +12603,7 @@
             </p:txBody>
           </p:sp>
         </mc:Choice>
-        <mc:Fallback xmlns="">
+        <mc:Fallback>
           <p:sp>
             <p:nvSpPr>
               <p:cNvPr id="3" name="Content Placeholder 2">
@@ -17545,7 +17545,7 @@
           <a:p>
             <a:r>
               <a:rPr lang="en-US" dirty="0"/>
-              <a:t>Doesn’t require invariants from user – finds them</a:t>
+              <a:t>Can be used without invariants from user – supposed to find them</a:t>
             </a:r>
           </a:p>
           <a:p>
@@ -21976,13 +21976,7 @@
                         <a:rPr lang="en-US" b="0" i="1" smtClean="0">
                           <a:latin typeface="Cambria Math" panose="02040503050406030204" pitchFamily="18" charset="0"/>
                         </a:rPr>
-                        <m:t>#</m:t>
-                      </m:r>
-                      <m:r>
-                        <a:rPr lang="en-US" b="0" i="1" smtClean="0">
-                          <a:latin typeface="Cambria Math" panose="02040503050406030204" pitchFamily="18" charset="0"/>
-                        </a:rPr>
-                        <m:t>1</m:t>
+                        <m:t>#1</m:t>
                       </m:r>
                       <m:d>
                         <m:dPr>
@@ -22110,13 +22104,7 @@
                             <a:rPr lang="en-US" b="0" i="1" smtClean="0">
                               <a:latin typeface="Cambria Math" panose="02040503050406030204" pitchFamily="18" charset="0"/>
                             </a:rPr>
-                            <m:t>≤</m:t>
-                          </m:r>
-                          <m:r>
-                            <a:rPr lang="en-US" b="0" i="1" smtClean="0">
-                              <a:latin typeface="Cambria Math" panose="02040503050406030204" pitchFamily="18" charset="0"/>
-                            </a:rPr>
-                            <m:t>0</m:t>
+                            <m:t>≤0</m:t>
                           </m:r>
                         </m:e>
                       </m:d>
@@ -22181,13 +22169,7 @@
                             <a:rPr lang="en-US" b="0" i="1" smtClean="0">
                               <a:latin typeface="Cambria Math" panose="02040503050406030204" pitchFamily="18" charset="0"/>
                             </a:rPr>
-                            <m:t>≤</m:t>
-                          </m:r>
-                          <m:r>
-                            <a:rPr lang="en-US" b="0" i="1" smtClean="0">
-                              <a:latin typeface="Cambria Math" panose="02040503050406030204" pitchFamily="18" charset="0"/>
-                            </a:rPr>
-                            <m:t>0</m:t>
+                            <m:t>≤0</m:t>
                           </m:r>
                         </m:e>
                       </m:d>
@@ -22240,13 +22222,7 @@
                             <a:rPr lang="en-US" b="0" i="1" smtClean="0">
                               <a:latin typeface="Cambria Math" panose="02040503050406030204" pitchFamily="18" charset="0"/>
                             </a:rPr>
-                            <m:t>≤</m:t>
-                          </m:r>
-                          <m:r>
-                            <a:rPr lang="en-US" b="0" i="1" smtClean="0">
-                              <a:latin typeface="Cambria Math" panose="02040503050406030204" pitchFamily="18" charset="0"/>
-                            </a:rPr>
-                            <m:t>0</m:t>
+                            <m:t>≤0</m:t>
                           </m:r>
                         </m:e>
                       </m:d>
@@ -36189,13 +36165,7 @@
                         <a:rPr lang="en-US" b="0" i="1" smtClean="0">
                           <a:latin typeface="Cambria Math" panose="02040503050406030204" pitchFamily="18" charset="0"/>
                         </a:rPr>
-                        <m:t>#</m:t>
-                      </m:r>
-                      <m:r>
-                        <a:rPr lang="en-US" b="0" i="1" smtClean="0">
-                          <a:latin typeface="Cambria Math" panose="02040503050406030204" pitchFamily="18" charset="0"/>
-                        </a:rPr>
-                        <m:t>1</m:t>
+                        <m:t>#1</m:t>
                       </m:r>
                       <m:d>
                         <m:dPr>
@@ -36299,13 +36269,7 @@
                                     <a:rPr lang="en-US" b="0" i="1" smtClean="0">
                                       <a:latin typeface="Cambria Math" panose="02040503050406030204" pitchFamily="18" charset="0"/>
                                     </a:rPr>
-                                    <m:t>≥</m:t>
-                                  </m:r>
-                                  <m:r>
-                                    <a:rPr lang="en-US" b="0" i="1" smtClean="0">
-                                      <a:latin typeface="Cambria Math" panose="02040503050406030204" pitchFamily="18" charset="0"/>
-                                    </a:rPr>
-                                    <m:t>2</m:t>
+                                    <m:t>≥2</m:t>
                                   </m:r>
                                 </m:e>
                               </m:d>
@@ -36337,19 +36301,7 @@
                                 <a:rPr lang="en-US" b="0" i="1" smtClean="0">
                                   <a:latin typeface="Cambria Math" panose="02040503050406030204" pitchFamily="18" charset="0"/>
                                 </a:rPr>
-                                <m:t>≤</m:t>
-                              </m:r>
-                              <m:r>
-                                <a:rPr lang="en-US" b="0" i="1" smtClean="0">
-                                  <a:latin typeface="Cambria Math" panose="02040503050406030204" pitchFamily="18" charset="0"/>
-                                </a:rPr>
-                                <m:t>0</m:t>
-                              </m:r>
-                              <m:r>
-                                <a:rPr lang="en-US" b="0" i="1" smtClean="0">
-                                  <a:latin typeface="Cambria Math" panose="02040503050406030204" pitchFamily="18" charset="0"/>
-                                </a:rPr>
-                                <m:t>∨¬</m:t>
+                                <m:t>≤0∨¬</m:t>
                               </m:r>
                               <m:d>
                                 <m:dPr>
@@ -36370,13 +36322,7 @@
                                     <a:rPr lang="en-US" b="0" i="1" smtClean="0">
                                       <a:latin typeface="Cambria Math" panose="02040503050406030204" pitchFamily="18" charset="0"/>
                                     </a:rPr>
-                                    <m:t>≤</m:t>
-                                  </m:r>
-                                  <m:r>
-                                    <a:rPr lang="en-US" b="0" i="1" smtClean="0">
-                                      <a:latin typeface="Cambria Math" panose="02040503050406030204" pitchFamily="18" charset="0"/>
-                                    </a:rPr>
-                                    <m:t>1</m:t>
+                                    <m:t>≤1</m:t>
                                   </m:r>
                                 </m:e>
                               </m:d>
@@ -36407,13 +36353,7 @@
                                 <a:rPr lang="en-US" b="0" i="1" smtClean="0">
                                   <a:latin typeface="Cambria Math" panose="02040503050406030204" pitchFamily="18" charset="0"/>
                                 </a:rPr>
-                                <m:t>≥</m:t>
-                              </m:r>
-                              <m:r>
-                                <a:rPr lang="en-US" b="0" i="1" smtClean="0">
-                                  <a:latin typeface="Cambria Math" panose="02040503050406030204" pitchFamily="18" charset="0"/>
-                                </a:rPr>
-                                <m:t>0</m:t>
+                                <m:t>≥0</m:t>
                               </m:r>
                             </m:e>
                           </m:d>
@@ -36442,13 +36382,7 @@
                                 <a:rPr lang="en-US" b="0" i="1" smtClean="0">
                                   <a:latin typeface="Cambria Math" panose="02040503050406030204" pitchFamily="18" charset="0"/>
                                 </a:rPr>
-                                <m:t>≤</m:t>
-                              </m:r>
-                              <m:r>
-                                <a:rPr lang="en-US" b="0" i="1" smtClean="0">
-                                  <a:latin typeface="Cambria Math" panose="02040503050406030204" pitchFamily="18" charset="0"/>
-                                </a:rPr>
-                                <m:t>0</m:t>
+                                <m:t>≤0</m:t>
                               </m:r>
                             </m:e>
                           </m:d>
@@ -36492,13 +36426,7 @@
                                     <a:rPr lang="en-US" b="0" i="1" smtClean="0">
                                       <a:latin typeface="Cambria Math" panose="02040503050406030204" pitchFamily="18" charset="0"/>
                                     </a:rPr>
-                                    <m:t>≥</m:t>
-                                  </m:r>
-                                  <m:r>
-                                    <a:rPr lang="en-US" b="0" i="1" smtClean="0">
-                                      <a:latin typeface="Cambria Math" panose="02040503050406030204" pitchFamily="18" charset="0"/>
-                                    </a:rPr>
-                                    <m:t>2</m:t>
+                                    <m:t>≥2</m:t>
                                   </m:r>
                                 </m:e>
                               </m:d>
@@ -36530,13 +36458,7 @@
                                 <a:rPr lang="en-US" b="0" i="1" smtClean="0">
                                   <a:latin typeface="Cambria Math" panose="02040503050406030204" pitchFamily="18" charset="0"/>
                                 </a:rPr>
-                                <m:t>≤</m:t>
-                              </m:r>
-                              <m:r>
-                                <a:rPr lang="en-US" b="0" i="1" smtClean="0">
-                                  <a:latin typeface="Cambria Math" panose="02040503050406030204" pitchFamily="18" charset="0"/>
-                                </a:rPr>
-                                <m:t>0</m:t>
+                                <m:t>≤0</m:t>
                               </m:r>
                             </m:e>
                           </m:d>
@@ -36567,19 +36489,7 @@
                             <a:rPr lang="en-US" b="0" i="1" smtClean="0">
                               <a:latin typeface="Cambria Math" panose="02040503050406030204" pitchFamily="18" charset="0"/>
                             </a:rPr>
-                            <m:t>≥</m:t>
-                          </m:r>
-                          <m:r>
-                            <a:rPr lang="en-US" b="0" i="1" smtClean="0">
-                              <a:latin typeface="Cambria Math" panose="02040503050406030204" pitchFamily="18" charset="0"/>
-                            </a:rPr>
-                            <m:t>2</m:t>
-                          </m:r>
-                          <m:r>
-                            <a:rPr lang="en-US" b="0" i="1" smtClean="0">
-                              <a:latin typeface="Cambria Math" panose="02040503050406030204" pitchFamily="18" charset="0"/>
-                            </a:rPr>
-                            <m:t>→</m:t>
+                            <m:t>≥2→</m:t>
                           </m:r>
                           <m:d>
                             <m:dPr>
@@ -36624,13 +36534,7 @@
                                 <a:rPr lang="en-US" b="0" i="1" smtClean="0">
                                   <a:latin typeface="Cambria Math" panose="02040503050406030204" pitchFamily="18" charset="0"/>
                                 </a:rPr>
-                                <m:t>&gt;</m:t>
-                              </m:r>
-                              <m:r>
-                                <a:rPr lang="en-US" b="0" i="1" smtClean="0">
-                                  <a:latin typeface="Cambria Math" panose="02040503050406030204" pitchFamily="18" charset="0"/>
-                                </a:rPr>
-                                <m:t>1</m:t>
+                                <m:t>&gt;1</m:t>
                               </m:r>
                             </m:e>
                           </m:d>
@@ -36661,13 +36565,7 @@
                             <a:rPr lang="en-US" b="0" i="1" smtClean="0">
                               <a:latin typeface="Cambria Math" panose="02040503050406030204" pitchFamily="18" charset="0"/>
                             </a:rPr>
-                            <m:t>≥</m:t>
-                          </m:r>
-                          <m:r>
-                            <a:rPr lang="en-US" b="0" i="1" smtClean="0">
-                              <a:latin typeface="Cambria Math" panose="02040503050406030204" pitchFamily="18" charset="0"/>
-                            </a:rPr>
-                            <m:t>0</m:t>
+                            <m:t>≥0</m:t>
                           </m:r>
                         </m:e>
                       </m:d>
@@ -36696,13 +36594,7 @@
                             <a:rPr lang="en-US" b="0" i="1" smtClean="0">
                               <a:latin typeface="Cambria Math" panose="02040503050406030204" pitchFamily="18" charset="0"/>
                             </a:rPr>
-                            <m:t>&gt;</m:t>
-                          </m:r>
-                          <m:r>
-                            <a:rPr lang="en-US" b="0" i="1" smtClean="0">
-                              <a:latin typeface="Cambria Math" panose="02040503050406030204" pitchFamily="18" charset="0"/>
-                            </a:rPr>
-                            <m:t>0</m:t>
+                            <m:t>&gt;0</m:t>
                           </m:r>
                         </m:e>
                       </m:d>
@@ -36731,19 +36623,7 @@
                             <a:rPr lang="en-US" b="0" i="1" smtClean="0">
                               <a:latin typeface="Cambria Math" panose="02040503050406030204" pitchFamily="18" charset="0"/>
                             </a:rPr>
-                            <m:t>≥</m:t>
-                          </m:r>
-                          <m:r>
-                            <a:rPr lang="en-US" b="0" i="1" smtClean="0">
-                              <a:latin typeface="Cambria Math" panose="02040503050406030204" pitchFamily="18" charset="0"/>
-                            </a:rPr>
-                            <m:t>2</m:t>
-                          </m:r>
-                          <m:r>
-                            <a:rPr lang="en-US" b="0" i="1" smtClean="0">
-                              <a:latin typeface="Cambria Math" panose="02040503050406030204" pitchFamily="18" charset="0"/>
-                            </a:rPr>
-                            <m:t>→</m:t>
+                            <m:t>≥2→</m:t>
                           </m:r>
                           <m:r>
                             <a:rPr lang="en-US" b="0" i="1" smtClean="0">
@@ -36767,13 +36647,7 @@
                             <a:rPr lang="en-US" b="0" i="1" smtClean="0">
                               <a:latin typeface="Cambria Math" panose="02040503050406030204" pitchFamily="18" charset="0"/>
                             </a:rPr>
-                            <m:t>&gt;</m:t>
-                          </m:r>
-                          <m:r>
-                            <a:rPr lang="en-US" b="0" i="1" smtClean="0">
-                              <a:latin typeface="Cambria Math" panose="02040503050406030204" pitchFamily="18" charset="0"/>
-                            </a:rPr>
-                            <m:t>0</m:t>
+                            <m:t>&gt;0</m:t>
                           </m:r>
                         </m:e>
                       </m:d>
@@ -37135,7 +37009,11 @@
           <a:p>
             <a:r>
               <a:rPr lang="en-US" dirty="0"/>
-              <a:t>Contains 1 functions: </a:t>
+              <a:t>Contains </a:t>
+            </a:r>
+            <a:r>
+              <a:rPr lang="en-US"/>
+              <a:t>a single function: </a:t>
             </a:r>
             <a:r>
               <a:rPr lang="en-US" dirty="0" err="1"/>
@@ -49972,13 +49850,7 @@
                       <a:rPr lang="en-US" b="0" i="1" smtClean="0">
                         <a:latin typeface="Cambria Math" panose="02040503050406030204" pitchFamily="18" charset="0"/>
                       </a:rPr>
-                      <m:t>&gt;</m:t>
-                    </m:r>
-                    <m:r>
-                      <a:rPr lang="en-US" b="0" i="1" smtClean="0">
-                        <a:latin typeface="Cambria Math" panose="02040503050406030204" pitchFamily="18" charset="0"/>
-                      </a:rPr>
-                      <m:t>0</m:t>
+                      <m:t>&gt;0</m:t>
                     </m:r>
                   </m:oMath>
                 </a14:m>
@@ -49998,13 +49870,7 @@
                       <a:rPr lang="en-US" b="0" i="1" smtClean="0">
                         <a:latin typeface="Cambria Math" panose="02040503050406030204" pitchFamily="18" charset="0"/>
                       </a:rPr>
-                      <m:t>≥</m:t>
-                    </m:r>
-                    <m:r>
-                      <a:rPr lang="en-US" b="0" i="1" smtClean="0">
-                        <a:latin typeface="Cambria Math" panose="02040503050406030204" pitchFamily="18" charset="0"/>
-                      </a:rPr>
-                      <m:t>0</m:t>
+                      <m:t>≥0</m:t>
                     </m:r>
                   </m:oMath>
                 </a14:m>

</xml_diff>